<commit_message>
Included license in activity.docx
</commit_message>
<xml_diff>
--- a/tutorial1/Git-Tutorial1-CCSCNE-2016.pptx
+++ b/tutorial1/Git-Tutorial1-CCSCNE-2016.pptx
@@ -108,6 +108,11 @@
       </a:defRPr>
     </a:lvl9pPr>
   </p:defaultTextStyle>
+  <p:extLst>
+    <p:ext uri="{EFAFB233-063F-42B5-8137-9DF3F51BA10A}">
+      <p15:sldGuideLst xmlns:p15="http://schemas.microsoft.com/office/powerpoint/2012/main"/>
+    </p:ext>
+  </p:extLst>
 </p:presentation>
 </file>
 
@@ -242,7 +247,7 @@
           <a:p>
             <a:fld id="{0D8639E2-D525-4C6F-BFC0-15D06606E14B}" type="datetimeFigureOut">
               <a:rPr lang="en-US" smtClean="0"/>
-              <a:t>4/21/2016</a:t>
+              <a:t>4/22/2016</a:t>
             </a:fld>
             <a:endParaRPr lang="en-US"/>
           </a:p>
@@ -412,7 +417,7 @@
           <a:p>
             <a:fld id="{0D8639E2-D525-4C6F-BFC0-15D06606E14B}" type="datetimeFigureOut">
               <a:rPr lang="en-US" smtClean="0"/>
-              <a:t>4/21/2016</a:t>
+              <a:t>4/22/2016</a:t>
             </a:fld>
             <a:endParaRPr lang="en-US"/>
           </a:p>
@@ -592,7 +597,7 @@
           <a:p>
             <a:fld id="{0D8639E2-D525-4C6F-BFC0-15D06606E14B}" type="datetimeFigureOut">
               <a:rPr lang="en-US" smtClean="0"/>
-              <a:t>4/21/2016</a:t>
+              <a:t>4/22/2016</a:t>
             </a:fld>
             <a:endParaRPr lang="en-US"/>
           </a:p>
@@ -762,7 +767,7 @@
           <a:p>
             <a:fld id="{0D8639E2-D525-4C6F-BFC0-15D06606E14B}" type="datetimeFigureOut">
               <a:rPr lang="en-US" smtClean="0"/>
-              <a:t>4/21/2016</a:t>
+              <a:t>4/22/2016</a:t>
             </a:fld>
             <a:endParaRPr lang="en-US"/>
           </a:p>
@@ -1008,7 +1013,7 @@
           <a:p>
             <a:fld id="{0D8639E2-D525-4C6F-BFC0-15D06606E14B}" type="datetimeFigureOut">
               <a:rPr lang="en-US" smtClean="0"/>
-              <a:t>4/21/2016</a:t>
+              <a:t>4/22/2016</a:t>
             </a:fld>
             <a:endParaRPr lang="en-US"/>
           </a:p>
@@ -1240,7 +1245,7 @@
           <a:p>
             <a:fld id="{0D8639E2-D525-4C6F-BFC0-15D06606E14B}" type="datetimeFigureOut">
               <a:rPr lang="en-US" smtClean="0"/>
-              <a:t>4/21/2016</a:t>
+              <a:t>4/22/2016</a:t>
             </a:fld>
             <a:endParaRPr lang="en-US"/>
           </a:p>
@@ -1607,7 +1612,7 @@
           <a:p>
             <a:fld id="{0D8639E2-D525-4C6F-BFC0-15D06606E14B}" type="datetimeFigureOut">
               <a:rPr lang="en-US" smtClean="0"/>
-              <a:t>4/21/2016</a:t>
+              <a:t>4/22/2016</a:t>
             </a:fld>
             <a:endParaRPr lang="en-US"/>
           </a:p>
@@ -1725,7 +1730,7 @@
           <a:p>
             <a:fld id="{0D8639E2-D525-4C6F-BFC0-15D06606E14B}" type="datetimeFigureOut">
               <a:rPr lang="en-US" smtClean="0"/>
-              <a:t>4/21/2016</a:t>
+              <a:t>4/22/2016</a:t>
             </a:fld>
             <a:endParaRPr lang="en-US"/>
           </a:p>
@@ -1820,7 +1825,7 @@
           <a:p>
             <a:fld id="{0D8639E2-D525-4C6F-BFC0-15D06606E14B}" type="datetimeFigureOut">
               <a:rPr lang="en-US" smtClean="0"/>
-              <a:t>4/21/2016</a:t>
+              <a:t>4/22/2016</a:t>
             </a:fld>
             <a:endParaRPr lang="en-US"/>
           </a:p>
@@ -2097,7 +2102,7 @@
           <a:p>
             <a:fld id="{0D8639E2-D525-4C6F-BFC0-15D06606E14B}" type="datetimeFigureOut">
               <a:rPr lang="en-US" smtClean="0"/>
-              <a:t>4/21/2016</a:t>
+              <a:t>4/22/2016</a:t>
             </a:fld>
             <a:endParaRPr lang="en-US"/>
           </a:p>
@@ -2350,7 +2355,7 @@
           <a:p>
             <a:fld id="{0D8639E2-D525-4C6F-BFC0-15D06606E14B}" type="datetimeFigureOut">
               <a:rPr lang="en-US" smtClean="0"/>
-              <a:t>4/21/2016</a:t>
+              <a:t>4/22/2016</a:t>
             </a:fld>
             <a:endParaRPr lang="en-US"/>
           </a:p>
@@ -2563,7 +2568,7 @@
           <a:p>
             <a:fld id="{0D8639E2-D525-4C6F-BFC0-15D06606E14B}" type="datetimeFigureOut">
               <a:rPr lang="en-US" smtClean="0"/>
-              <a:t>4/21/2016</a:t>
+              <a:t>4/22/2016</a:t>
             </a:fld>
             <a:endParaRPr lang="en-US"/>
           </a:p>
@@ -3028,6 +3033,13 @@
   <p:clrMapOvr>
     <a:masterClrMapping/>
   </p:clrMapOvr>
+  <p:timing>
+    <p:tnLst>
+      <p:par>
+        <p:cTn id="1" dur="indefinite" restart="never" nodeType="tmRoot"/>
+      </p:par>
+    </p:tnLst>
+  </p:timing>
 </p:sld>
 </file>
 
@@ -3115,6 +3127,13 @@
   <p:clrMapOvr>
     <a:masterClrMapping/>
   </p:clrMapOvr>
+  <p:timing>
+    <p:tnLst>
+      <p:par>
+        <p:cTn id="1" dur="indefinite" restart="never" nodeType="tmRoot"/>
+      </p:par>
+    </p:tnLst>
+  </p:timing>
 </p:sld>
 </file>
 
@@ -3217,6 +3236,13 @@
   <p:clrMapOvr>
     <a:masterClrMapping/>
   </p:clrMapOvr>
+  <p:timing>
+    <p:tnLst>
+      <p:par>
+        <p:cTn id="1" dur="indefinite" restart="never" nodeType="tmRoot"/>
+      </p:par>
+    </p:tnLst>
+  </p:timing>
 </p:sld>
 </file>
 
@@ -4144,6 +4170,13 @@
   <p:clrMapOvr>
     <a:masterClrMapping/>
   </p:clrMapOvr>
+  <p:timing>
+    <p:tnLst>
+      <p:par>
+        <p:cTn id="1" dur="indefinite" restart="never" nodeType="tmRoot"/>
+      </p:par>
+    </p:tnLst>
+  </p:timing>
 </p:sld>
 </file>
 
@@ -4310,6 +4343,13 @@
   <p:clrMapOvr>
     <a:masterClrMapping/>
   </p:clrMapOvr>
+  <p:timing>
+    <p:tnLst>
+      <p:par>
+        <p:cTn id="1" dur="indefinite" restart="never" nodeType="tmRoot"/>
+      </p:par>
+    </p:tnLst>
+  </p:timing>
 </p:sld>
 </file>
 

</xml_diff>

<commit_message>
Get presentation out of master slide view
</commit_message>
<xml_diff>
--- a/tutorial1/Git-Tutorial1-CCSCNE-2016.pptx
+++ b/tutorial1/Git-Tutorial1-CCSCNE-2016.pptx
@@ -116,7 +116,7 @@
   </p:defaultTextStyle>
   <p:extLst>
     <p:ext uri="{EFAFB233-063F-42B5-8137-9DF3F51BA10A}">
-      <p15:sldGuideLst xmlns:p15="http://schemas.microsoft.com/office/powerpoint/2012/main" xmlns=""/>
+      <p15:sldGuideLst xmlns="" xmlns:p15="http://schemas.microsoft.com/office/powerpoint/2012/main"/>
     </p:ext>
   </p:extLst>
 </p:presentation>
@@ -7178,11 +7178,7 @@
             <a:pPr lvl="1"/>
             <a:r>
               <a:rPr lang="en-US" sz="1800" dirty="0"/>
-              <a:t>This material is based on work supported by the National Science Foundation under Grants </a:t>
-            </a:r>
-            <a:r>
-              <a:rPr lang="en-US" sz="1800" dirty="0"/>
-              <a:t>DUE-1225708, DUE-1225738, DUE-1225688, DUE-1525039 DUE-1524898, and DUE-1524877</a:t>
+              <a:t>This material is based on work supported by the National Science Foundation under Grants DUE-1225708, DUE-1225738, DUE-1225688, DUE-1525039 DUE-1524898, and DUE-1524877</a:t>
             </a:r>
             <a:r>
               <a:rPr lang="en-US" sz="1800" dirty="0" smtClean="0"/>
@@ -7204,11 +7200,7 @@
           <a:p>
             <a:r>
               <a:rPr lang="en-US" dirty="0" smtClean="0"/>
-              <a:t>Copyright </a:t>
-            </a:r>
-            <a:r>
-              <a:rPr lang="en-US" dirty="0" smtClean="0"/>
-              <a:t>and Licensing</a:t>
+              <a:t>Copyright and Licensing</a:t>
             </a:r>
           </a:p>
           <a:p>
@@ -8165,7 +8157,7 @@
   <a:extraClrSchemeLst/>
   <a:extLst>
     <a:ext uri="{05A4C25C-085E-4340-85A3-A5531E510DB2}">
-      <thm15:themeFamily xmlns:thm15="http://schemas.microsoft.com/office/thememl/2012/main" xmlns="" name="Office Theme" id="{62F939B6-93AF-4DB8-9C6B-D6C7DFDC589F}" vid="{4A3C46E8-61CC-4603-A589-7422A47A8E4A}"/>
+      <thm15:themeFamily xmlns="" xmlns:thm15="http://schemas.microsoft.com/office/thememl/2012/main" name="Office Theme" id="{62F939B6-93AF-4DB8-9C6B-D6C7DFDC589F}" vid="{4A3C46E8-61CC-4603-A589-7422A47A8E4A}"/>
     </a:ext>
   </a:extLst>
 </a:theme>
@@ -8426,7 +8418,7 @@
   <a:extraClrSchemeLst/>
   <a:extLst>
     <a:ext uri="{05A4C25C-085E-4340-85A3-A5531E510DB2}">
-      <thm15:themeFamily xmlns:thm15="http://schemas.microsoft.com/office/thememl/2012/main" xmlns="" name="Office Theme" id="{62F939B6-93AF-4DB8-9C6B-D6C7DFDC589F}" vid="{4A3C46E8-61CC-4603-A589-7422A47A8E4A}"/>
+      <thm15:themeFamily xmlns="" xmlns:thm15="http://schemas.microsoft.com/office/thememl/2012/main" name="Office Theme" id="{62F939B6-93AF-4DB8-9C6B-D6C7DFDC589F}" vid="{4A3C46E8-61CC-4603-A589-7422A47A8E4A}"/>
     </a:ext>
   </a:extLst>
 </a:theme>

</xml_diff>